<commit_message>
vylepšení obsahu (hypertextové odkazy na elementy)
</commit_message>
<xml_diff>
--- a/Presentations/06-RIDICS_Zaklady-XML-TEI-Standard-XML-TEI-Zakladni-prvky.pptx
+++ b/Presentations/06-RIDICS_Zaklady-XML-TEI-Standard-XML-TEI-Zakladni-prvky.pptx
@@ -269,7 +269,7 @@
           <a:p>
             <a:fld id="{693D0AAB-BC65-4D93-BE30-329DE1D7C511}" type="datetimeFigureOut">
               <a:rPr lang="cs-CZ" smtClean="0"/>
-              <a:t>07.05.2019</a:t>
+              <a:t>09.05.2019</a:t>
             </a:fld>
             <a:endParaRPr lang="cs-CZ"/>
           </a:p>
@@ -378,7 +378,7 @@
           <a:p>
             <a:fld id="{BF6F0682-C2CD-439F-BD5E-D51593A61157}" type="datetimeFigureOut">
               <a:rPr lang="cs-CZ" smtClean="0"/>
-              <a:t>07.05.2019</a:t>
+              <a:t>09.05.2019</a:t>
             </a:fld>
             <a:endParaRPr lang="cs-CZ"/>
           </a:p>
@@ -13457,7 +13457,7 @@
           <p:nvPr>
             <p:extLst>
               <p:ext uri="{D42A27DB-BD31-4B8C-83A1-F6EECF244321}">
-                <p14:modId xmlns:p14="http://schemas.microsoft.com/office/powerpoint/2010/main" val="983226114"/>
+                <p14:modId xmlns:p14="http://schemas.microsoft.com/office/powerpoint/2010/main" val="1738805230"/>
               </p:ext>
             </p:extLst>
           </p:nvPr>
@@ -13529,7 +13529,17 @@
                     <a:p>
                       <a:r>
                         <a:rPr lang="en-US" dirty="0"/>
-                        <a:t>&lt;front&gt;</a:t>
+                        <a:t>&lt;</a:t>
+                      </a:r>
+                      <a:r>
+                        <a:rPr lang="cs-CZ" dirty="0">
+                          <a:hlinkClick r:id="rId3" tooltip="(front matter) contains any prefatory matter (headers, abstracts, title page, prefaces, dedications, etc.) found at the start of a document, before the main body."/>
+                        </a:rPr>
+                        <a:t>front</a:t>
+                      </a:r>
+                      <a:r>
+                        <a:rPr lang="en-US" dirty="0"/>
+                        <a:t>&gt;</a:t>
                       </a:r>
                       <a:endParaRPr lang="cs-CZ" dirty="0"/>
                     </a:p>
@@ -13576,7 +13586,17 @@
                     <a:p>
                       <a:r>
                         <a:rPr lang="cs-CZ" dirty="0"/>
-                        <a:t>&lt;body&gt;</a:t>
+                        <a:t>&lt;</a:t>
+                      </a:r>
+                      <a:r>
+                        <a:rPr lang="cs-CZ" dirty="0">
+                          <a:hlinkClick r:id="rId4" tooltip="(text body) contains the whole body of a single unitary text, excluding any front or back matter."/>
+                        </a:rPr>
+                        <a:t>body</a:t>
+                      </a:r>
+                      <a:r>
+                        <a:rPr lang="cs-CZ" dirty="0"/>
+                        <a:t>&gt;</a:t>
                       </a:r>
                     </a:p>
                   </a:txBody>
@@ -13612,7 +13632,9 @@
                         <a:t>&lt;</a:t>
                       </a:r>
                       <a:r>
-                        <a:rPr lang="cs-CZ" dirty="0" err="1"/>
+                        <a:rPr lang="cs-CZ" dirty="0" err="1">
+                          <a:hlinkClick r:id="rId5" tooltip="(back matter) contains any appendixes, etc. following the main part of a text."/>
+                        </a:rPr>
                         <a:t>back</a:t>
                       </a:r>
                       <a:r>
@@ -13737,7 +13759,7 @@
                       </a:r>
                       <a:r>
                         <a:rPr lang="cs-CZ" dirty="0">
-                          <a:hlinkClick r:id="rId3" tooltip="(text division) contains a subdivision of the front, body, or back of a text."/>
+                          <a:hlinkClick r:id="rId6" tooltip="(text division) contains a subdivision of the front, body, or back of a text."/>
                         </a:rPr>
                         <a:t>div</a:t>
                       </a:r>
@@ -13780,7 +13802,7 @@
                       </a:r>
                       <a:r>
                         <a:rPr lang="cs-CZ" dirty="0" err="1">
-                          <a:hlinkClick r:id="rId4" tooltip="(level-1 text division) contains a first-level subdivision of the front, body, or back of a text."/>
+                          <a:hlinkClick r:id="rId7" tooltip="(level-1 text division) contains a first-level subdivision of the front, body, or back of a text."/>
                         </a:rPr>
                         <a:t>div1</a:t>
                       </a:r>
@@ -14043,7 +14065,7 @@
           <p:nvPr>
             <p:extLst>
               <p:ext uri="{D42A27DB-BD31-4B8C-83A1-F6EECF244321}">
-                <p14:modId xmlns:p14="http://schemas.microsoft.com/office/powerpoint/2010/main" val="2182474500"/>
+                <p14:modId xmlns:p14="http://schemas.microsoft.com/office/powerpoint/2010/main" val="2827692932"/>
               </p:ext>
             </p:extLst>
           </p:nvPr>
@@ -14118,7 +14140,9 @@
                         <a:t>&lt;</a:t>
                       </a:r>
                       <a:r>
-                        <a:rPr lang="cs-CZ" dirty="0" err="1"/>
+                        <a:rPr lang="cs-CZ" dirty="0" err="1">
+                          <a:hlinkClick r:id="rId3" tooltip="(title page) contains the title page of a text, appearing within the front or back matter."/>
+                        </a:rPr>
                         <a:t>titlePage</a:t>
                       </a:r>
                       <a:r>
@@ -14184,7 +14208,9 @@
                         <a:t>&lt;</a:t>
                       </a:r>
                       <a:r>
-                        <a:rPr lang="cs-CZ" dirty="0" err="1"/>
+                        <a:rPr lang="cs-CZ" dirty="0" err="1">
+                          <a:hlinkClick r:id="rId4" tooltip="(document title) contains the title of a document, including all its constituents, as given on a title page."/>
+                        </a:rPr>
                         <a:t>docTitle</a:t>
                       </a:r>
                       <a:r>
@@ -14242,7 +14268,9 @@
                         <a:t>&lt;</a:t>
                       </a:r>
                       <a:r>
-                        <a:rPr lang="cs-CZ" dirty="0" err="1"/>
+                        <a:rPr lang="cs-CZ" dirty="0" err="1">
+                          <a:hlinkClick r:id="rId5" tooltip="contains a subsection or division of the title of a work, as indicated on a title page."/>
+                        </a:rPr>
                         <a:t>titlePart</a:t>
                       </a:r>
                       <a:r>
@@ -14284,7 +14312,7 @@
                       </a:r>
                       <a:r>
                         <a:rPr lang="cs-CZ" dirty="0" err="1">
-                          <a:hlinkClick r:id="rId3" tooltip="(document author) contains the name of the author of the document, as given on the title page (often but not always contained in a byline)."/>
+                          <a:hlinkClick r:id="rId6" tooltip="(document author) contains the name of the author of the document, as given on the title page (often but not always contained in a byline)."/>
                         </a:rPr>
                         <a:t>docAuthor</a:t>
                       </a:r>
@@ -14327,7 +14355,7 @@
                       </a:r>
                       <a:r>
                         <a:rPr lang="cs-CZ" dirty="0" err="1">
-                          <a:hlinkClick r:id="rId4" tooltip="(document date) contains the date of a document, as given on a title page or in a dateline."/>
+                          <a:hlinkClick r:id="rId7" tooltip="(document date) contains the date of a document, as given on a title page or in a dateline."/>
                         </a:rPr>
                         <a:t>docDate</a:t>
                       </a:r>
@@ -14369,7 +14397,9 @@
                         <a:t>&lt;</a:t>
                       </a:r>
                       <a:r>
-                        <a:rPr lang="cs-CZ" dirty="0" err="1"/>
+                        <a:rPr lang="cs-CZ" dirty="0" err="1">
+                          <a:hlinkClick r:id="rId8" tooltip="(document imprint) contains the imprint statement (place and date of publication, publisher name), as given (usually) at the foot of a title page."/>
+                        </a:rPr>
                         <a:t>docImprint</a:t>
                       </a:r>
                       <a:r>
@@ -14410,7 +14440,9 @@
                         <a:t>&lt;</a:t>
                       </a:r>
                       <a:r>
-                        <a:rPr lang="cs-CZ" dirty="0" err="1"/>
+                        <a:rPr lang="cs-CZ" dirty="0" err="1">
+                          <a:hlinkClick r:id="rId9" tooltip="(document edition) contains an edition statement as presented on a title page of a document."/>
+                        </a:rPr>
                         <a:t>docEdition</a:t>
                       </a:r>
                       <a:r>
@@ -14465,7 +14497,17 @@
                       </a:pPr>
                       <a:r>
                         <a:rPr lang="en-US" dirty="0"/>
-                        <a:t>&lt;imprimatur&gt;</a:t>
+                        <a:t>&lt;</a:t>
+                      </a:r>
+                      <a:r>
+                        <a:rPr lang="cs-CZ" dirty="0">
+                          <a:hlinkClick r:id="rId10" tooltip="contains a formal statement authorizing the publication of a work, sometimes required to appear on a title page or its verso."/>
+                        </a:rPr>
+                        <a:t>imprimatur</a:t>
+                      </a:r>
+                      <a:r>
+                        <a:rPr lang="en-US" dirty="0"/>
+                        <a:t>&gt;</a:t>
                       </a:r>
                       <a:endParaRPr lang="cs-CZ" dirty="0"/>
                     </a:p>

</xml_diff>

<commit_message>
doplněny odkazy na další zdroje (videokurz a Digital Editing of Medieval Texts: A Textbook)
</commit_message>
<xml_diff>
--- a/Presentations/06-RIDICS_Zaklady-XML-TEI-Standard-XML-TEI-Zakladni-prvky.pptx
+++ b/Presentations/06-RIDICS_Zaklady-XML-TEI-Standard-XML-TEI-Zakladni-prvky.pptx
@@ -5,10 +5,10 @@
     <p:sldMasterId id="2147483648" r:id="rId1"/>
   </p:sldMasterIdLst>
   <p:notesMasterIdLst>
-    <p:notesMasterId r:id="rId20"/>
+    <p:notesMasterId r:id="rId21"/>
   </p:notesMasterIdLst>
   <p:handoutMasterIdLst>
-    <p:handoutMasterId r:id="rId21"/>
+    <p:handoutMasterId r:id="rId22"/>
   </p:handoutMasterIdLst>
   <p:sldIdLst>
     <p:sldId id="256" r:id="rId2"/>
@@ -29,6 +29,7 @@
     <p:sldId id="278" r:id="rId17"/>
     <p:sldId id="275" r:id="rId18"/>
     <p:sldId id="279" r:id="rId19"/>
+    <p:sldId id="282" r:id="rId20"/>
   </p:sldIdLst>
   <p:sldSz cx="12192000" cy="6858000"/>
   <p:notesSz cx="9144000" cy="6858000"/>
@@ -269,7 +270,7 @@
           <a:p>
             <a:fld id="{693D0AAB-BC65-4D93-BE30-329DE1D7C511}" type="datetimeFigureOut">
               <a:rPr lang="cs-CZ" smtClean="0"/>
-              <a:t>09.05.2019</a:t>
+              <a:t>10.05.2019</a:t>
             </a:fld>
             <a:endParaRPr lang="cs-CZ"/>
           </a:p>
@@ -378,7 +379,7 @@
           <a:p>
             <a:fld id="{BF6F0682-C2CD-439F-BD5E-D51593A61157}" type="datetimeFigureOut">
               <a:rPr lang="cs-CZ" smtClean="0"/>
-              <a:t>09.05.2019</a:t>
+              <a:t>10.05.2019</a:t>
             </a:fld>
             <a:endParaRPr lang="cs-CZ"/>
           </a:p>
@@ -12996,6 +12997,194 @@
 </p:sld>
 </file>
 
+<file path=ppt/slides/slide19.xml><?xml version="1.0" encoding="utf-8"?>
+<p:sld xmlns:a="http://schemas.openxmlformats.org/drawingml/2006/main" xmlns:r="http://schemas.openxmlformats.org/officeDocument/2006/relationships" xmlns:p="http://schemas.openxmlformats.org/presentationml/2006/main">
+  <p:cSld>
+    <p:spTree>
+      <p:nvGrpSpPr>
+        <p:cNvPr id="1" name=""/>
+        <p:cNvGrpSpPr/>
+        <p:nvPr/>
+      </p:nvGrpSpPr>
+      <p:grpSpPr>
+        <a:xfrm>
+          <a:off x="0" y="0"/>
+          <a:ext cx="0" cy="0"/>
+          <a:chOff x="0" y="0"/>
+          <a:chExt cx="0" cy="0"/>
+        </a:xfrm>
+      </p:grpSpPr>
+      <p:sp>
+        <p:nvSpPr>
+          <p:cNvPr id="2" name="Nadpis 1">
+            <a:extLst>
+              <a:ext uri="{FF2B5EF4-FFF2-40B4-BE49-F238E27FC236}">
+                <a16:creationId xmlns:a16="http://schemas.microsoft.com/office/drawing/2014/main" id="{B73B01E2-D309-487E-ADA9-AAD133BE8980}"/>
+              </a:ext>
+            </a:extLst>
+          </p:cNvPr>
+          <p:cNvSpPr>
+            <a:spLocks noGrp="1"/>
+          </p:cNvSpPr>
+          <p:nvPr>
+            <p:ph type="title"/>
+          </p:nvPr>
+        </p:nvSpPr>
+        <p:spPr/>
+        <p:txBody>
+          <a:bodyPr/>
+          <a:lstStyle/>
+          <a:p>
+            <a:r>
+              <a:rPr lang="cs-CZ" dirty="0"/>
+              <a:t>Odkazy na další zdroje</a:t>
+            </a:r>
+          </a:p>
+        </p:txBody>
+      </p:sp>
+      <p:sp>
+        <p:nvSpPr>
+          <p:cNvPr id="3" name="Zástupný obsah 2">
+            <a:extLst>
+              <a:ext uri="{FF2B5EF4-FFF2-40B4-BE49-F238E27FC236}">
+                <a16:creationId xmlns:a16="http://schemas.microsoft.com/office/drawing/2014/main" id="{7A5A83BF-7F7D-4D6A-9E50-8F9AE55063C4}"/>
+              </a:ext>
+            </a:extLst>
+          </p:cNvPr>
+          <p:cNvSpPr>
+            <a:spLocks noGrp="1"/>
+          </p:cNvSpPr>
+          <p:nvPr>
+            <p:ph idx="1"/>
+          </p:nvPr>
+        </p:nvSpPr>
+        <p:spPr/>
+        <p:txBody>
+          <a:bodyPr/>
+          <a:lstStyle/>
+          <a:p>
+            <a:r>
+              <a:rPr lang="cs-CZ" dirty="0">
+                <a:hlinkClick r:id="rId2"/>
+              </a:rPr>
+              <a:t>https://www.digitalmanuscripts.eu/digital-editing-of-medieval-texts-a-textbook/</a:t>
+            </a:r>
+            <a:endParaRPr lang="cs-CZ" dirty="0"/>
+          </a:p>
+          <a:p>
+            <a:pPr lvl="1"/>
+            <a:r>
+              <a:rPr lang="cs-CZ" dirty="0"/>
+              <a:t>odkazy na videokurz a </a:t>
+            </a:r>
+            <a:r>
+              <a:rPr lang="en-US" i="1" dirty="0"/>
+              <a:t>Digital Editing of Medieval Texts: A Textbook</a:t>
+            </a:r>
+            <a:endParaRPr lang="cs-CZ" i="1" dirty="0"/>
+          </a:p>
+        </p:txBody>
+      </p:sp>
+      <p:sp>
+        <p:nvSpPr>
+          <p:cNvPr id="4" name="Zástupný symbol pro datum 3">
+            <a:extLst>
+              <a:ext uri="{FF2B5EF4-FFF2-40B4-BE49-F238E27FC236}">
+                <a16:creationId xmlns:a16="http://schemas.microsoft.com/office/drawing/2014/main" id="{D094249A-CBCB-49C6-9ACC-A1B5CF2A4590}"/>
+              </a:ext>
+            </a:extLst>
+          </p:cNvPr>
+          <p:cNvSpPr>
+            <a:spLocks noGrp="1"/>
+          </p:cNvSpPr>
+          <p:nvPr>
+            <p:ph type="dt" sz="half" idx="10"/>
+          </p:nvPr>
+        </p:nvSpPr>
+        <p:spPr/>
+        <p:txBody>
+          <a:bodyPr/>
+          <a:lstStyle/>
+          <a:p>
+            <a:r>
+              <a:rPr lang="cs-CZ"/>
+              <a:t>Praha, 9. a 10. května 2019</a:t>
+            </a:r>
+            <a:endParaRPr lang="cs-CZ" dirty="0"/>
+          </a:p>
+        </p:txBody>
+      </p:sp>
+      <p:sp>
+        <p:nvSpPr>
+          <p:cNvPr id="5" name="Zástupný symbol pro zápatí 4">
+            <a:extLst>
+              <a:ext uri="{FF2B5EF4-FFF2-40B4-BE49-F238E27FC236}">
+                <a16:creationId xmlns:a16="http://schemas.microsoft.com/office/drawing/2014/main" id="{0365EC59-5862-4F27-B564-BEFA22330E92}"/>
+              </a:ext>
+            </a:extLst>
+          </p:cNvPr>
+          <p:cNvSpPr>
+            <a:spLocks noGrp="1"/>
+          </p:cNvSpPr>
+          <p:nvPr>
+            <p:ph type="ftr" sz="quarter" idx="11"/>
+          </p:nvPr>
+        </p:nvSpPr>
+        <p:spPr/>
+        <p:txBody>
+          <a:bodyPr/>
+          <a:lstStyle/>
+          <a:p>
+            <a:r>
+              <a:rPr lang="cs-CZ"/>
+              <a:t>Standard XML TEI – Základní prvky</a:t>
+            </a:r>
+            <a:endParaRPr lang="cs-CZ" dirty="0"/>
+          </a:p>
+        </p:txBody>
+      </p:sp>
+      <p:sp>
+        <p:nvSpPr>
+          <p:cNvPr id="6" name="Zástupný symbol pro číslo snímku 5">
+            <a:extLst>
+              <a:ext uri="{FF2B5EF4-FFF2-40B4-BE49-F238E27FC236}">
+                <a16:creationId xmlns:a16="http://schemas.microsoft.com/office/drawing/2014/main" id="{05702B0B-F88B-4153-9A10-4355F86C6893}"/>
+              </a:ext>
+            </a:extLst>
+          </p:cNvPr>
+          <p:cNvSpPr>
+            <a:spLocks noGrp="1"/>
+          </p:cNvSpPr>
+          <p:nvPr>
+            <p:ph type="sldNum" sz="quarter" idx="12"/>
+          </p:nvPr>
+        </p:nvSpPr>
+        <p:spPr/>
+        <p:txBody>
+          <a:bodyPr/>
+          <a:lstStyle/>
+          <a:p>
+            <a:fld id="{5B64AE77-6BC1-49CA-AA73-E9D0D5F1D944}" type="slidenum">
+              <a:rPr lang="cs-CZ" smtClean="0"/>
+              <a:t>19</a:t>
+            </a:fld>
+            <a:endParaRPr lang="cs-CZ" dirty="0"/>
+          </a:p>
+        </p:txBody>
+      </p:sp>
+    </p:spTree>
+    <p:extLst>
+      <p:ext uri="{BB962C8B-B14F-4D97-AF65-F5344CB8AC3E}">
+        <p14:creationId xmlns:p14="http://schemas.microsoft.com/office/powerpoint/2010/main" val="4030248597"/>
+      </p:ext>
+    </p:extLst>
+  </p:cSld>
+  <p:clrMapOvr>
+    <a:masterClrMapping/>
+  </p:clrMapOvr>
+</p:sld>
+</file>
+
 <file path=ppt/slides/slide2.xml><?xml version="1.0" encoding="utf-8"?>
 <p:sld xmlns:a="http://schemas.openxmlformats.org/drawingml/2006/main" xmlns:r="http://schemas.openxmlformats.org/officeDocument/2006/relationships" xmlns:p="http://schemas.openxmlformats.org/presentationml/2006/main">
   <p:cSld>
@@ -13178,7 +13367,10 @@
             </a:r>
           </a:p>
           <a:p>
-            <a:endParaRPr lang="cs-CZ" dirty="0"/>
+            <a:r>
+              <a:rPr lang="cs-CZ" dirty="0"/>
+              <a:t>Odkazy na další zdroje</a:t>
+            </a:r>
           </a:p>
           <a:p>
             <a:endParaRPr lang="cs-CZ" dirty="0"/>

</xml_diff>